<commit_message>
updating slides for sorting day
</commit_message>
<xml_diff>
--- a/ClassMaterials/Sorting/Slides/Part1-SelectionSortAndAnalysis.pptx
+++ b/ClassMaterials/Sorting/Slides/Part1-SelectionSortAndAnalysis.pptx
@@ -14,7 +14,7 @@
     <p:sldId id="256" r:id="rId2"/>
     <p:sldId id="274" r:id="rId3"/>
     <p:sldId id="261" r:id="rId4"/>
-    <p:sldId id="278" r:id="rId5"/>
+    <p:sldId id="287" r:id="rId5"/>
     <p:sldId id="262" r:id="rId6"/>
     <p:sldId id="280" r:id="rId7"/>
     <p:sldId id="279" r:id="rId8"/>
@@ -173,6 +173,80 @@
 </p:presentation>
 </file>
 
+<file path=ppt/revisionInfo.xml><?xml version="1.0" encoding="utf-8"?>
+<p1510:revInfo xmlns:a="http://schemas.openxmlformats.org/drawingml/2006/main" xmlns:r="http://schemas.openxmlformats.org/officeDocument/2006/relationships" xmlns:p1510="http://schemas.microsoft.com/office/powerpoint/2015/10/main">
+  <p1510:revLst>
+    <p1510:client id="{3C6BB0C4-C7D7-42CA-8DA1-B1337A4CAECA}" v="2" dt="2023-11-20T21:52:50.644"/>
+  </p1510:revLst>
+</p1510:revInfo>
+</file>
+
+<file path=ppt/changesInfos/changesInfo1.xml><?xml version="1.0" encoding="utf-8"?>
+<pc:chgInfo xmlns:a="http://schemas.openxmlformats.org/drawingml/2006/main" xmlns:r="http://schemas.openxmlformats.org/officeDocument/2006/relationships" xmlns:ac="http://schemas.microsoft.com/office/drawing/2013/main/command" xmlns:pc="http://schemas.microsoft.com/office/powerpoint/2013/main/command">
+  <pc:docChgLst>
+    <pc:chgData name="Yoder, Jason" userId="28f4d4d8-da04-4f86-b14d-a21675737bc5" providerId="ADAL" clId="{3C6BB0C4-C7D7-42CA-8DA1-B1337A4CAECA}"/>
+    <pc:docChg chg="custSel addSld delSld modSld">
+      <pc:chgData name="Yoder, Jason" userId="28f4d4d8-da04-4f86-b14d-a21675737bc5" providerId="ADAL" clId="{3C6BB0C4-C7D7-42CA-8DA1-B1337A4CAECA}" dt="2023-11-20T21:55:01.256" v="163" actId="20577"/>
+      <pc:docMkLst>
+        <pc:docMk/>
+      </pc:docMkLst>
+      <pc:sldChg chg="addSp delSp modSp mod">
+        <pc:chgData name="Yoder, Jason" userId="28f4d4d8-da04-4f86-b14d-a21675737bc5" providerId="ADAL" clId="{3C6BB0C4-C7D7-42CA-8DA1-B1337A4CAECA}" dt="2023-11-20T21:52:36.257" v="11"/>
+        <pc:sldMkLst>
+          <pc:docMk/>
+          <pc:sldMk cId="0" sldId="256"/>
+        </pc:sldMkLst>
+        <pc:spChg chg="mod">
+          <ac:chgData name="Yoder, Jason" userId="28f4d4d8-da04-4f86-b14d-a21675737bc5" providerId="ADAL" clId="{3C6BB0C4-C7D7-42CA-8DA1-B1337A4CAECA}" dt="2023-11-20T21:52:22.823" v="9" actId="20577"/>
+          <ac:spMkLst>
+            <pc:docMk/>
+            <pc:sldMk cId="0" sldId="256"/>
+            <ac:spMk id="3" creationId="{B07C73E1-123D-587B-9987-0F2E97F6208C}"/>
+          </ac:spMkLst>
+        </pc:spChg>
+        <pc:spChg chg="del">
+          <ac:chgData name="Yoder, Jason" userId="28f4d4d8-da04-4f86-b14d-a21675737bc5" providerId="ADAL" clId="{3C6BB0C4-C7D7-42CA-8DA1-B1337A4CAECA}" dt="2023-11-20T21:52:35.982" v="10" actId="478"/>
+          <ac:spMkLst>
+            <pc:docMk/>
+            <pc:sldMk cId="0" sldId="256"/>
+            <ac:spMk id="5" creationId="{26B3CE9F-948B-7C48-A057-E53E8192A79A}"/>
+          </ac:spMkLst>
+        </pc:spChg>
+        <pc:spChg chg="add mod">
+          <ac:chgData name="Yoder, Jason" userId="28f4d4d8-da04-4f86-b14d-a21675737bc5" providerId="ADAL" clId="{3C6BB0C4-C7D7-42CA-8DA1-B1337A4CAECA}" dt="2023-11-20T21:52:36.257" v="11"/>
+          <ac:spMkLst>
+            <pc:docMk/>
+            <pc:sldMk cId="0" sldId="256"/>
+            <ac:spMk id="6" creationId="{F711D897-0F0D-0878-287A-8B0F8F3BD42A}"/>
+          </ac:spMkLst>
+        </pc:spChg>
+      </pc:sldChg>
+      <pc:sldChg chg="modNotesTx">
+        <pc:chgData name="Yoder, Jason" userId="28f4d4d8-da04-4f86-b14d-a21675737bc5" providerId="ADAL" clId="{3C6BB0C4-C7D7-42CA-8DA1-B1337A4CAECA}" dt="2023-11-20T21:55:01.256" v="163" actId="20577"/>
+        <pc:sldMkLst>
+          <pc:docMk/>
+          <pc:sldMk cId="0" sldId="267"/>
+        </pc:sldMkLst>
+      </pc:sldChg>
+      <pc:sldChg chg="del">
+        <pc:chgData name="Yoder, Jason" userId="28f4d4d8-da04-4f86-b14d-a21675737bc5" providerId="ADAL" clId="{3C6BB0C4-C7D7-42CA-8DA1-B1337A4CAECA}" dt="2023-11-20T21:52:52.390" v="13" actId="47"/>
+        <pc:sldMkLst>
+          <pc:docMk/>
+          <pc:sldMk cId="2264806080" sldId="278"/>
+        </pc:sldMkLst>
+      </pc:sldChg>
+      <pc:sldChg chg="add">
+        <pc:chgData name="Yoder, Jason" userId="28f4d4d8-da04-4f86-b14d-a21675737bc5" providerId="ADAL" clId="{3C6BB0C4-C7D7-42CA-8DA1-B1337A4CAECA}" dt="2023-11-20T21:52:50.642" v="12"/>
+        <pc:sldMkLst>
+          <pc:docMk/>
+          <pc:sldMk cId="602523907" sldId="287"/>
+        </pc:sldMkLst>
+      </pc:sldChg>
+    </pc:docChg>
+  </pc:docChgLst>
+</pc:chgInfo>
+</file>
+
 <file path=ppt/handoutMasters/handoutMaster1.xml><?xml version="1.0" encoding="utf-8"?>
 <p:handoutMaster xmlns:a="http://schemas.openxmlformats.org/drawingml/2006/main" xmlns:r="http://schemas.openxmlformats.org/officeDocument/2006/relationships" xmlns:p="http://schemas.openxmlformats.org/presentationml/2006/main">
   <p:cSld>
@@ -290,7 +364,7 @@
               <a:pPr>
                 <a:defRPr/>
               </a:pPr>
-              <a:t>11/22/2022</a:t>
+              <a:t>11/20/2023</a:t>
             </a:fld>
             <a:endParaRPr lang="en-US"/>
           </a:p>
@@ -525,7 +599,7 @@
               <a:pPr>
                 <a:defRPr/>
               </a:pPr>
-              <a:t>11/22/2022</a:t>
+              <a:t>11/20/2023</a:t>
             </a:fld>
             <a:endParaRPr lang="en-US"/>
           </a:p>
@@ -1524,9 +1598,14 @@
           <a:lstStyle/>
           <a:p>
             <a:r>
+              <a:rPr lang="en-US" dirty="0"/>
+              <a:t>Can pick an example expression for this and work out on board if you like, but not needed in CSSE220 to </a:t>
+            </a:r>
+            <a:r>
               <a:rPr lang="en-US"/>
-              <a:t>Work out c and n0 for each of the examples on the quiz.</a:t>
-            </a:r>
+              <a:t>do this</a:t>
+            </a:r>
+            <a:endParaRPr lang="en-US" dirty="0"/>
           </a:p>
         </p:txBody>
       </p:sp>
@@ -2652,7 +2731,7 @@
               <a:pPr>
                 <a:defRPr/>
               </a:pPr>
-              <a:t>Tuesday, November 22, 2022</a:t>
+              <a:t>Monday, November 20, 2023</a:t>
             </a:fld>
             <a:endParaRPr lang="en-US" dirty="0"/>
           </a:p>
@@ -2835,7 +2914,7 @@
               <a:pPr>
                 <a:defRPr/>
               </a:pPr>
-              <a:t>Tuesday, November 22, 2022</a:t>
+              <a:t>Monday, November 20, 2023</a:t>
             </a:fld>
             <a:endParaRPr lang="en-US" dirty="0"/>
           </a:p>
@@ -3028,7 +3107,7 @@
               <a:pPr>
                 <a:defRPr/>
               </a:pPr>
-              <a:t>Tuesday, November 22, 2022</a:t>
+              <a:t>Monday, November 20, 2023</a:t>
             </a:fld>
             <a:endParaRPr lang="en-US" dirty="0"/>
           </a:p>
@@ -3211,7 +3290,7 @@
               <a:pPr>
                 <a:defRPr/>
               </a:pPr>
-              <a:t>Tuesday, November 22, 2022</a:t>
+              <a:t>Monday, November 20, 2023</a:t>
             </a:fld>
             <a:endParaRPr lang="en-US" dirty="0"/>
           </a:p>
@@ -3471,7 +3550,7 @@
               <a:pPr>
                 <a:defRPr/>
               </a:pPr>
-              <a:t>Tuesday, November 22, 2022</a:t>
+              <a:t>Monday, November 20, 2023</a:t>
             </a:fld>
             <a:endParaRPr lang="en-US"/>
           </a:p>
@@ -3771,7 +3850,7 @@
               <a:pPr>
                 <a:defRPr/>
               </a:pPr>
-              <a:t>Tuesday, November 22, 2022</a:t>
+              <a:t>Monday, November 20, 2023</a:t>
             </a:fld>
             <a:endParaRPr lang="en-US"/>
           </a:p>
@@ -4205,7 +4284,7 @@
               <a:pPr>
                 <a:defRPr/>
               </a:pPr>
-              <a:t>Tuesday, November 22, 2022</a:t>
+              <a:t>Monday, November 20, 2023</a:t>
             </a:fld>
             <a:endParaRPr lang="en-US"/>
           </a:p>
@@ -4337,7 +4416,7 @@
               <a:pPr>
                 <a:defRPr/>
               </a:pPr>
-              <a:t>Tuesday, November 22, 2022</a:t>
+              <a:t>Monday, November 20, 2023</a:t>
             </a:fld>
             <a:endParaRPr lang="en-US"/>
           </a:p>
@@ -4447,7 +4526,7 @@
               <a:pPr>
                 <a:defRPr/>
               </a:pPr>
-              <a:t>Tuesday, November 22, 2022</a:t>
+              <a:t>Monday, November 20, 2023</a:t>
             </a:fld>
             <a:endParaRPr lang="en-US" dirty="0"/>
           </a:p>
@@ -4737,7 +4816,7 @@
               <a:pPr>
                 <a:defRPr/>
               </a:pPr>
-              <a:t>Tuesday, November 22, 2022</a:t>
+              <a:t>Monday, November 20, 2023</a:t>
             </a:fld>
             <a:endParaRPr lang="en-US"/>
           </a:p>
@@ -5004,7 +5083,7 @@
               <a:pPr>
                 <a:defRPr/>
               </a:pPr>
-              <a:t>Tuesday, November 22, 2022</a:t>
+              <a:t>Monday, November 20, 2023</a:t>
             </a:fld>
             <a:endParaRPr lang="en-US"/>
           </a:p>
@@ -5230,7 +5309,7 @@
               <a:pPr>
                 <a:defRPr/>
               </a:pPr>
-              <a:t>Tuesday, November 22, 2022</a:t>
+              <a:t>Monday, November 20, 2023</a:t>
             </a:fld>
             <a:endParaRPr lang="en-US" dirty="0"/>
           </a:p>
@@ -5698,99 +5777,6 @@
       </p:sp>
       <p:sp>
         <p:nvSpPr>
-          <p:cNvPr id="5" name="Rectangle 4">
-            <a:extLst>
-              <a:ext uri="{FF2B5EF4-FFF2-40B4-BE49-F238E27FC236}">
-                <a16:creationId xmlns:a16="http://schemas.microsoft.com/office/drawing/2014/main" id="{26B3CE9F-948B-7C48-A057-E53E8192A79A}"/>
-              </a:ext>
-            </a:extLst>
-          </p:cNvPr>
-          <p:cNvSpPr/>
-          <p:nvPr/>
-        </p:nvSpPr>
-        <p:spPr>
-          <a:xfrm>
-            <a:off x="304800" y="5235575"/>
-            <a:ext cx="8534400" cy="1295400"/>
-          </a:xfrm>
-          <a:prstGeom prst="rect">
-            <a:avLst/>
-          </a:prstGeom>
-          <a:solidFill>
-            <a:schemeClr val="accent3"/>
-          </a:solidFill>
-        </p:spPr>
-        <p:style>
-          <a:lnRef idx="2">
-            <a:schemeClr val="accent3">
-              <a:shade val="50000"/>
-            </a:schemeClr>
-          </a:lnRef>
-          <a:fillRef idx="1">
-            <a:schemeClr val="accent3"/>
-          </a:fillRef>
-          <a:effectRef idx="0">
-            <a:schemeClr val="accent3"/>
-          </a:effectRef>
-          <a:fontRef idx="minor">
-            <a:schemeClr val="lt1"/>
-          </a:fontRef>
-        </p:style>
-        <p:txBody>
-          <a:bodyPr rtlCol="0" anchor="ctr"/>
-          <a:lstStyle/>
-          <a:p>
-            <a:r>
-              <a:rPr lang="en-US" sz="2400" dirty="0">
-                <a:solidFill>
-                  <a:srgbClr val="FFFFFF"/>
-                </a:solidFill>
-              </a:rPr>
-              <a:t>The </a:t>
-            </a:r>
-            <a:r>
-              <a:rPr lang="en-US" sz="2400" i="1" dirty="0">
-                <a:solidFill>
-                  <a:srgbClr val="FFFFFF"/>
-                </a:solidFill>
-              </a:rPr>
-              <a:t>git</a:t>
-            </a:r>
-            <a:r>
-              <a:rPr lang="en-US" sz="2400" dirty="0">
-                <a:solidFill>
-                  <a:srgbClr val="FFFFFF"/>
-                </a:solidFill>
-              </a:rPr>
-              <a:t> projects for today are:</a:t>
-            </a:r>
-          </a:p>
-          <a:p>
-            <a:pPr marL="342900" indent="-342900">
-              <a:buFont typeface="Arial" panose="020B0604020202020204" pitchFamily="34" charset="0"/>
-              <a:buChar char="•"/>
-            </a:pPr>
-            <a:r>
-              <a:rPr lang="en-US" sz="2400" i="1" dirty="0" err="1"/>
-              <a:t>PracticeSortingAndSearching</a:t>
-            </a:r>
-            <a:endParaRPr lang="en-US" sz="2400" i="1" dirty="0"/>
-          </a:p>
-          <a:p>
-            <a:pPr marL="342900" indent="-342900">
-              <a:buFont typeface="Arial" panose="020B0604020202020204" pitchFamily="34" charset="0"/>
-              <a:buChar char="•"/>
-            </a:pPr>
-            <a:r>
-              <a:rPr lang="en-US" sz="2400" i="1" dirty="0" err="1"/>
-              <a:t>PracticeSortingAndSearchingSolution</a:t>
-            </a:r>
-            <a:endParaRPr lang="en-US" sz="2400" i="1" dirty="0"/>
-          </a:p>
-        </p:txBody>
-      </p:sp>
-      <p:sp>
-        <p:nvSpPr>
           <p:cNvPr id="3" name="TextBox 2">
             <a:extLst>
               <a:ext uri="{FF2B5EF4-FFF2-40B4-BE49-F238E27FC236}">
@@ -5850,7 +5836,7 @@
                   <a:srgbClr val="FFFF00"/>
                 </a:highlight>
               </a:rPr>
-              <a:t>sorting</a:t>
+              <a:t>__________</a:t>
             </a:r>
           </a:p>
         </p:txBody>
@@ -5885,6 +5871,124 @@
           </a:prstGeom>
         </p:spPr>
       </p:pic>
+      <p:sp>
+        <p:nvSpPr>
+          <p:cNvPr id="6" name="Rectangle 5">
+            <a:extLst>
+              <a:ext uri="{FF2B5EF4-FFF2-40B4-BE49-F238E27FC236}">
+                <a16:creationId xmlns:a16="http://schemas.microsoft.com/office/drawing/2014/main" id="{F711D897-0F0D-0878-287A-8B0F8F3BD42A}"/>
+              </a:ext>
+            </a:extLst>
+          </p:cNvPr>
+          <p:cNvSpPr/>
+          <p:nvPr/>
+        </p:nvSpPr>
+        <p:spPr>
+          <a:xfrm>
+            <a:off x="304800" y="4600575"/>
+            <a:ext cx="8534400" cy="1930400"/>
+          </a:xfrm>
+          <a:prstGeom prst="rect">
+            <a:avLst/>
+          </a:prstGeom>
+          <a:solidFill>
+            <a:schemeClr val="accent3"/>
+          </a:solidFill>
+        </p:spPr>
+        <p:style>
+          <a:lnRef idx="2">
+            <a:schemeClr val="accent3">
+              <a:shade val="50000"/>
+            </a:schemeClr>
+          </a:lnRef>
+          <a:fillRef idx="1">
+            <a:schemeClr val="accent3"/>
+          </a:fillRef>
+          <a:effectRef idx="0">
+            <a:schemeClr val="accent3"/>
+          </a:effectRef>
+          <a:fontRef idx="minor">
+            <a:schemeClr val="lt1"/>
+          </a:fontRef>
+        </p:style>
+        <p:txBody>
+          <a:bodyPr rtlCol="0" anchor="ctr"/>
+          <a:lstStyle/>
+          <a:p>
+            <a:r>
+              <a:rPr lang="en-US" sz="2400" dirty="0">
+                <a:solidFill>
+                  <a:srgbClr val="FFFFFF"/>
+                </a:solidFill>
+              </a:rPr>
+              <a:t>The </a:t>
+            </a:r>
+            <a:r>
+              <a:rPr lang="en-US" sz="2400" i="1" dirty="0">
+                <a:solidFill>
+                  <a:srgbClr val="FFFFFF"/>
+                </a:solidFill>
+              </a:rPr>
+              <a:t>git</a:t>
+            </a:r>
+            <a:r>
+              <a:rPr lang="en-US" sz="2400" dirty="0">
+                <a:solidFill>
+                  <a:srgbClr val="FFFFFF"/>
+                </a:solidFill>
+              </a:rPr>
+              <a:t> projects for today are:</a:t>
+            </a:r>
+          </a:p>
+          <a:p>
+            <a:pPr marL="342900" indent="-342900">
+              <a:buFont typeface="Arial" panose="020B0604020202020204" pitchFamily="34" charset="0"/>
+              <a:buChar char="•"/>
+            </a:pPr>
+            <a:r>
+              <a:rPr lang="en-US" sz="2400" i="1" dirty="0" err="1"/>
+              <a:t>PracticeSortingAndSearching</a:t>
+            </a:r>
+            <a:endParaRPr lang="en-US" sz="2400" i="1" dirty="0"/>
+          </a:p>
+          <a:p>
+            <a:pPr marL="342900" indent="-342900">
+              <a:buFont typeface="Arial" panose="020B0604020202020204" pitchFamily="34" charset="0"/>
+              <a:buChar char="•"/>
+            </a:pPr>
+            <a:r>
+              <a:rPr lang="en-US" sz="2400" i="1" dirty="0" err="1"/>
+              <a:t>PracticeSortingAndSearchingSolution</a:t>
+            </a:r>
+            <a:endParaRPr lang="en-US" sz="2400" i="1" dirty="0"/>
+          </a:p>
+          <a:p>
+            <a:r>
+              <a:rPr lang="en-US" sz="2400" dirty="0"/>
+              <a:t>The </a:t>
+            </a:r>
+            <a:r>
+              <a:rPr lang="en-US" sz="2400" i="1" dirty="0"/>
+              <a:t>Quiz</a:t>
+            </a:r>
+            <a:r>
+              <a:rPr lang="en-US" sz="2400" dirty="0"/>
+              <a:t> for Today is:</a:t>
+            </a:r>
+          </a:p>
+          <a:p>
+            <a:pPr marL="342900" indent="-342900">
+              <a:buFont typeface="Arial" panose="020B0604020202020204" pitchFamily="34" charset="0"/>
+              <a:buChar char="•"/>
+            </a:pPr>
+            <a:r>
+              <a:rPr lang="en-US" sz="2400" i="1" dirty="0" err="1"/>
+              <a:t>SortingQuiz</a:t>
+            </a:r>
+            <a:endParaRPr lang="en-US" sz="2400" i="1" dirty="0"/>
+          </a:p>
+        </p:txBody>
+      </p:sp>
     </p:spTree>
   </p:cSld>
   <p:clrMapOvr>
@@ -8418,7 +8522,7 @@
               <a:rPr lang="en-US" sz="2800" dirty="0">
                 <a:latin typeface="+mn-lt"/>
               </a:rPr>
-              <a:t>Selection</a:t>
+              <a:t>Selection (Covered Today)</a:t>
             </a:r>
           </a:p>
           <a:p>
@@ -8430,7 +8534,7 @@
               <a:rPr lang="en-US" sz="2800" dirty="0">
                 <a:latin typeface="+mn-lt"/>
               </a:rPr>
-              <a:t>Insertion sort</a:t>
+              <a:t>Insertion sort (Covered Today)</a:t>
             </a:r>
           </a:p>
           <a:p>
@@ -8442,7 +8546,7 @@
               <a:rPr lang="en-US" sz="2800" dirty="0">
                 <a:latin typeface="+mn-lt"/>
               </a:rPr>
-              <a:t>Merge sort</a:t>
+              <a:t>Merge sort (Covered Next Class)</a:t>
             </a:r>
           </a:p>
           <a:p>
@@ -8501,7 +8605,7 @@
     </p:spTree>
     <p:extLst>
       <p:ext uri="{BB962C8B-B14F-4D97-AF65-F5344CB8AC3E}">
-        <p14:creationId xmlns:p14="http://schemas.microsoft.com/office/powerpoint/2010/main" val="2264806080"/>
+        <p14:creationId xmlns:p14="http://schemas.microsoft.com/office/powerpoint/2010/main" val="602523907"/>
       </p:ext>
     </p:extLst>
   </p:cSld>

</xml_diff>